<commit_message>
Git基本語法教學 - 複製.pptx content modify 20211006 pm 11:26
</commit_message>
<xml_diff>
--- a/Git基本語法教學 - 複製.pptx
+++ b/Git基本語法教學 - 複製.pptx
@@ -11,6 +11,7 @@
     <p:sldId id="258" r:id="rId5"/>
     <p:sldId id="261" r:id="rId6"/>
     <p:sldId id="259" r:id="rId7"/>
+    <p:sldId id="262" r:id="rId8"/>
   </p:sldIdLst>
   <p:sldSz cx="9144000" cy="6858000" type="screen4x3"/>
   <p:notesSz cx="6858000" cy="9144000"/>
@@ -261,7 +262,7 @@
             <a:fld id="{5BBEAD13-0566-4C6C-97E7-55F17F24B09F}" type="datetimeFigureOut">
               <a:rPr lang="zh-TW" altLang="en-US" smtClean="0"/>
               <a:pPr/>
-              <a:t>2021/10/3</a:t>
+              <a:t>2021/10/6</a:t>
             </a:fld>
             <a:endParaRPr lang="zh-TW" altLang="en-US"/>
           </a:p>
@@ -562,7 +563,7 @@
             <a:fld id="{5BBEAD13-0566-4C6C-97E7-55F17F24B09F}" type="datetimeFigureOut">
               <a:rPr lang="zh-TW" altLang="en-US" smtClean="0"/>
               <a:pPr/>
-              <a:t>2021/10/3</a:t>
+              <a:t>2021/10/6</a:t>
             </a:fld>
             <a:endParaRPr lang="zh-TW" altLang="en-US"/>
           </a:p>
@@ -739,7 +740,7 @@
             <a:fld id="{5BBEAD13-0566-4C6C-97E7-55F17F24B09F}" type="datetimeFigureOut">
               <a:rPr lang="zh-TW" altLang="en-US" smtClean="0"/>
               <a:pPr/>
-              <a:t>2021/10/3</a:t>
+              <a:t>2021/10/6</a:t>
             </a:fld>
             <a:endParaRPr lang="zh-TW" altLang="en-US"/>
           </a:p>
@@ -906,7 +907,7 @@
             <a:fld id="{5BBEAD13-0566-4C6C-97E7-55F17F24B09F}" type="datetimeFigureOut">
               <a:rPr lang="zh-TW" altLang="en-US" smtClean="0"/>
               <a:pPr/>
-              <a:t>2021/10/3</a:t>
+              <a:t>2021/10/6</a:t>
             </a:fld>
             <a:endParaRPr lang="zh-TW" altLang="en-US"/>
           </a:p>
@@ -1168,7 +1169,7 @@
             <a:fld id="{5BBEAD13-0566-4C6C-97E7-55F17F24B09F}" type="datetimeFigureOut">
               <a:rPr lang="zh-TW" altLang="en-US" smtClean="0"/>
               <a:pPr/>
-              <a:t>2021/10/3</a:t>
+              <a:t>2021/10/6</a:t>
             </a:fld>
             <a:endParaRPr lang="zh-TW" altLang="en-US"/>
           </a:p>
@@ -1624,7 +1625,7 @@
             <a:fld id="{5BBEAD13-0566-4C6C-97E7-55F17F24B09F}" type="datetimeFigureOut">
               <a:rPr lang="zh-TW" altLang="en-US" smtClean="0"/>
               <a:pPr/>
-              <a:t>2021/10/3</a:t>
+              <a:t>2021/10/6</a:t>
             </a:fld>
             <a:endParaRPr lang="zh-TW" altLang="en-US"/>
           </a:p>
@@ -2109,7 +2110,7 @@
             <a:fld id="{5BBEAD13-0566-4C6C-97E7-55F17F24B09F}" type="datetimeFigureOut">
               <a:rPr lang="zh-TW" altLang="en-US" smtClean="0"/>
               <a:pPr/>
-              <a:t>2021/10/3</a:t>
+              <a:t>2021/10/6</a:t>
             </a:fld>
             <a:endParaRPr lang="zh-TW" altLang="en-US"/>
           </a:p>
@@ -2229,7 +2230,7 @@
             <a:fld id="{5BBEAD13-0566-4C6C-97E7-55F17F24B09F}" type="datetimeFigureOut">
               <a:rPr lang="zh-TW" altLang="en-US" smtClean="0"/>
               <a:pPr/>
-              <a:t>2021/10/3</a:t>
+              <a:t>2021/10/6</a:t>
             </a:fld>
             <a:endParaRPr lang="zh-TW" altLang="en-US"/>
           </a:p>
@@ -2367,7 +2368,7 @@
             <a:fld id="{5BBEAD13-0566-4C6C-97E7-55F17F24B09F}" type="datetimeFigureOut">
               <a:rPr lang="zh-TW" altLang="en-US" smtClean="0"/>
               <a:pPr/>
-              <a:t>2021/10/3</a:t>
+              <a:t>2021/10/6</a:t>
             </a:fld>
             <a:endParaRPr lang="zh-TW" altLang="en-US"/>
           </a:p>
@@ -2683,7 +2684,7 @@
             <a:fld id="{5BBEAD13-0566-4C6C-97E7-55F17F24B09F}" type="datetimeFigureOut">
               <a:rPr lang="zh-TW" altLang="en-US" smtClean="0"/>
               <a:pPr/>
-              <a:t>2021/10/3</a:t>
+              <a:t>2021/10/6</a:t>
             </a:fld>
             <a:endParaRPr lang="zh-TW" altLang="en-US"/>
           </a:p>
@@ -2813,7 +2814,7 @@
             <a:fld id="{5BBEAD13-0566-4C6C-97E7-55F17F24B09F}" type="datetimeFigureOut">
               <a:rPr lang="zh-TW" altLang="en-US" smtClean="0"/>
               <a:pPr/>
-              <a:t>2021/10/3</a:t>
+              <a:t>2021/10/6</a:t>
             </a:fld>
             <a:endParaRPr lang="zh-TW" altLang="en-US"/>
           </a:p>
@@ -3574,7 +3575,7 @@
             <a:fld id="{5BBEAD13-0566-4C6C-97E7-55F17F24B09F}" type="datetimeFigureOut">
               <a:rPr lang="zh-TW" altLang="en-US" smtClean="0"/>
               <a:pPr/>
-              <a:t>2021/10/3</a:t>
+              <a:t>2021/10/6</a:t>
             </a:fld>
             <a:endParaRPr lang="zh-TW" altLang="en-US"/>
           </a:p>
@@ -4519,7 +4520,7 @@
             </a:r>
             <a:r>
               <a:rPr lang="zh-TW" altLang="en-US" dirty="0"/>
-              <a:t> ：添加追蹤項目</a:t>
+              <a:t>：添加追蹤項目</a:t>
             </a:r>
             <a:endParaRPr lang="en-US" altLang="zh-TW" dirty="0"/>
           </a:p>
@@ -4541,12 +4542,35 @@
             </a:r>
             <a:r>
               <a:rPr lang="zh-TW" altLang="en-US" dirty="0"/>
-              <a:t>：新建版本</a:t>
+              <a:t> </a:t>
+            </a:r>
+            <a:r>
+              <a:rPr lang="en-US" altLang="zh-TW" dirty="0"/>
+              <a:t>-m “</a:t>
+            </a:r>
+            <a:r>
+              <a:rPr lang="zh-TW" altLang="en-US" dirty="0"/>
+              <a:t>說明</a:t>
+            </a:r>
+            <a:r>
+              <a:rPr lang="en-US" altLang="zh-TW" dirty="0"/>
+              <a:t>”</a:t>
+            </a:r>
+            <a:r>
+              <a:rPr lang="zh-TW" altLang="en-US" dirty="0"/>
+              <a:t>：提交版本</a:t>
             </a:r>
             <a:endParaRPr lang="en-US" altLang="zh-TW" dirty="0"/>
           </a:p>
           <a:p>
-            <a:endParaRPr lang="zh-TW" altLang="en-US" dirty="0"/>
+            <a:r>
+              <a:rPr lang="en-US" altLang="zh-TW" dirty="0"/>
+              <a:t>git log</a:t>
+            </a:r>
+            <a:r>
+              <a:rPr lang="zh-TW" altLang="en-US" dirty="0"/>
+              <a:t>：瀏覽歷史紀錄</a:t>
+            </a:r>
           </a:p>
         </p:txBody>
       </p:sp>
@@ -4821,8 +4845,70 @@
           <a:p>
             <a:r>
               <a:rPr lang="en-US" altLang="zh-TW" dirty="0"/>
-              <a:t>git checkout &lt;branch&gt;</a:t>
-            </a:r>
+              <a:t>git branch &lt;</a:t>
+            </a:r>
+            <a:r>
+              <a:rPr lang="zh-TW" altLang="en-US" dirty="0"/>
+              <a:t>名稱</a:t>
+            </a:r>
+            <a:r>
+              <a:rPr lang="en-US" altLang="zh-TW" dirty="0"/>
+              <a:t>&gt;</a:t>
+            </a:r>
+            <a:r>
+              <a:rPr lang="zh-TW" altLang="en-US" dirty="0"/>
+              <a:t> ： 建立分支</a:t>
+            </a:r>
+            <a:endParaRPr lang="en-US" altLang="zh-TW" dirty="0"/>
+          </a:p>
+          <a:p>
+            <a:r>
+              <a:rPr lang="en-US" altLang="zh-TW" dirty="0"/>
+              <a:t>git branch -d &lt;</a:t>
+            </a:r>
+            <a:r>
+              <a:rPr lang="zh-TW" altLang="en-US" dirty="0"/>
+              <a:t>分支名</a:t>
+            </a:r>
+            <a:r>
+              <a:rPr lang="en-US" altLang="zh-TW" dirty="0"/>
+              <a:t>&gt;</a:t>
+            </a:r>
+            <a:r>
+              <a:rPr lang="zh-TW" altLang="en-US"/>
+              <a:t> ： 刪除分支</a:t>
+            </a:r>
+            <a:endParaRPr lang="en-US" altLang="zh-TW" dirty="0"/>
+          </a:p>
+          <a:p>
+            <a:r>
+              <a:rPr lang="en-US" altLang="zh-TW" dirty="0"/>
+              <a:t>git checkout &lt;</a:t>
+            </a:r>
+            <a:r>
+              <a:rPr lang="zh-TW" altLang="en-US" dirty="0"/>
+              <a:t>分支名</a:t>
+            </a:r>
+            <a:r>
+              <a:rPr lang="en-US" altLang="zh-TW" dirty="0"/>
+              <a:t>&gt;</a:t>
+            </a:r>
+            <a:r>
+              <a:rPr lang="zh-TW" altLang="en-US" dirty="0"/>
+              <a:t> ： 切換分支</a:t>
+            </a:r>
+            <a:endParaRPr lang="en-US" altLang="zh-TW" dirty="0"/>
+          </a:p>
+          <a:p>
+            <a:r>
+              <a:rPr lang="en-US" altLang="zh-TW" dirty="0"/>
+              <a:t>git merge</a:t>
+            </a:r>
+            <a:r>
+              <a:rPr lang="zh-TW" altLang="en-US" dirty="0"/>
+              <a:t>：分支合併</a:t>
+            </a:r>
+            <a:endParaRPr lang="en-US" altLang="zh-TW" dirty="0"/>
           </a:p>
           <a:p>
             <a:r>
@@ -4832,7 +4918,7 @@
           </a:p>
           <a:p>
             <a:r>
-              <a:rPr lang="en-US" altLang="zh-TW"/>
+              <a:rPr lang="en-US" altLang="zh-TW" dirty="0"/>
               <a:t>git push --tags</a:t>
             </a:r>
             <a:endParaRPr lang="zh-TW" altLang="en-US" dirty="0"/>
@@ -4843,6 +4929,447 @@
     <p:extLst>
       <p:ext uri="{BB962C8B-B14F-4D97-AF65-F5344CB8AC3E}">
         <p14:creationId xmlns:p14="http://schemas.microsoft.com/office/powerpoint/2010/main" val="3108781897"/>
+      </p:ext>
+    </p:extLst>
+  </p:cSld>
+  <p:clrMapOvr>
+    <a:masterClrMapping/>
+  </p:clrMapOvr>
+</p:sld>
+</file>
+
+<file path=ppt/slides/slide7.xml><?xml version="1.0" encoding="utf-8"?>
+<p:sld xmlns:a="http://schemas.openxmlformats.org/drawingml/2006/main" xmlns:r="http://schemas.openxmlformats.org/officeDocument/2006/relationships" xmlns:p="http://schemas.openxmlformats.org/presentationml/2006/main">
+  <p:cSld>
+    <p:spTree>
+      <p:nvGrpSpPr>
+        <p:cNvPr id="1" name=""/>
+        <p:cNvGrpSpPr/>
+        <p:nvPr/>
+      </p:nvGrpSpPr>
+      <p:grpSpPr>
+        <a:xfrm>
+          <a:off x="0" y="0"/>
+          <a:ext cx="0" cy="0"/>
+          <a:chOff x="0" y="0"/>
+          <a:chExt cx="0" cy="0"/>
+        </a:xfrm>
+      </p:grpSpPr>
+      <p:sp>
+        <p:nvSpPr>
+          <p:cNvPr id="2" name="標題 1">
+            <a:extLst>
+              <a:ext uri="{FF2B5EF4-FFF2-40B4-BE49-F238E27FC236}">
+                <a16:creationId xmlns:a16="http://schemas.microsoft.com/office/drawing/2014/main" id="{920F3F7B-6019-4308-8FF9-BDF164EC8B97}"/>
+              </a:ext>
+            </a:extLst>
+          </p:cNvPr>
+          <p:cNvSpPr>
+            <a:spLocks noGrp="1"/>
+          </p:cNvSpPr>
+          <p:nvPr>
+            <p:ph type="title"/>
+          </p:nvPr>
+        </p:nvSpPr>
+        <p:spPr/>
+        <p:txBody>
+          <a:bodyPr/>
+          <a:lstStyle/>
+          <a:p>
+            <a:r>
+              <a:rPr lang="zh-TW" altLang="en-US" dirty="0"/>
+              <a:t>版本異動</a:t>
+            </a:r>
+          </a:p>
+        </p:txBody>
+      </p:sp>
+      <p:sp>
+        <p:nvSpPr>
+          <p:cNvPr id="3" name="內容版面配置區 2">
+            <a:extLst>
+              <a:ext uri="{FF2B5EF4-FFF2-40B4-BE49-F238E27FC236}">
+                <a16:creationId xmlns:a16="http://schemas.microsoft.com/office/drawing/2014/main" id="{5F02ECFB-CE6A-4153-897F-02D9D6EE5A8E}"/>
+              </a:ext>
+            </a:extLst>
+          </p:cNvPr>
+          <p:cNvSpPr>
+            <a:spLocks noGrp="1"/>
+          </p:cNvSpPr>
+          <p:nvPr>
+            <p:ph idx="1"/>
+          </p:nvPr>
+        </p:nvSpPr>
+        <p:spPr/>
+        <p:txBody>
+          <a:bodyPr>
+            <a:normAutofit fontScale="92500" lnSpcReduction="20000"/>
+          </a:bodyPr>
+          <a:lstStyle/>
+          <a:p>
+            <a:pPr algn="l"/>
+            <a:r>
+              <a:rPr lang="en-US" altLang="zh-TW" b="0" i="0" dirty="0">
+                <a:solidFill>
+                  <a:srgbClr val="303233"/>
+                </a:solidFill>
+                <a:effectLst/>
+                <a:latin typeface="Lato" panose="020F0502020204030203" pitchFamily="34" charset="0"/>
+              </a:rPr>
+              <a:t>git reset </a:t>
+            </a:r>
+            <a:r>
+              <a:rPr lang="zh-TW" altLang="en-US" b="0" i="0" dirty="0">
+                <a:solidFill>
+                  <a:srgbClr val="303233"/>
+                </a:solidFill>
+                <a:effectLst/>
+                <a:latin typeface="Lato" panose="020F0502020204030203" pitchFamily="34" charset="0"/>
+              </a:rPr>
+              <a:t>及 </a:t>
+            </a:r>
+            <a:r>
+              <a:rPr lang="en-US" altLang="zh-TW" b="0" i="0" dirty="0">
+                <a:solidFill>
+                  <a:srgbClr val="303233"/>
+                </a:solidFill>
+                <a:effectLst/>
+                <a:latin typeface="Lato" panose="020F0502020204030203" pitchFamily="34" charset="0"/>
+              </a:rPr>
+              <a:t>git revert </a:t>
+            </a:r>
+            <a:r>
+              <a:rPr lang="zh-TW" altLang="en-US" b="0" i="0" dirty="0">
+                <a:solidFill>
+                  <a:srgbClr val="303233"/>
+                </a:solidFill>
+                <a:effectLst/>
+                <a:latin typeface="Lato" panose="020F0502020204030203" pitchFamily="34" charset="0"/>
+              </a:rPr>
+              <a:t>兩種指令可以使用</a:t>
+            </a:r>
+          </a:p>
+          <a:p>
+            <a:pPr algn="l">
+              <a:buFont typeface="Arial" panose="020B0604020202020204" pitchFamily="34" charset="0"/>
+              <a:buChar char="•"/>
+            </a:pPr>
+            <a:r>
+              <a:rPr lang="en-US" altLang="zh-TW" b="0" i="0" dirty="0">
+                <a:solidFill>
+                  <a:srgbClr val="303233"/>
+                </a:solidFill>
+                <a:effectLst/>
+                <a:latin typeface="Lato" panose="020F0502020204030203" pitchFamily="34" charset="0"/>
+              </a:rPr>
+              <a:t>reset</a:t>
+            </a:r>
+          </a:p>
+          <a:p>
+            <a:pPr marL="742950" lvl="1" indent="-285750" algn="l">
+              <a:buFont typeface="Arial" panose="020B0604020202020204" pitchFamily="34" charset="0"/>
+              <a:buChar char="•"/>
+            </a:pPr>
+            <a:r>
+              <a:rPr lang="zh-TW" altLang="en-US" b="0" i="0" dirty="0">
+                <a:solidFill>
+                  <a:srgbClr val="303233"/>
+                </a:solidFill>
+                <a:effectLst/>
+                <a:latin typeface="Lato" panose="020F0502020204030203" pitchFamily="34" charset="0"/>
+              </a:rPr>
+              <a:t>會直接將這個分支的</a:t>
+            </a:r>
+            <a:r>
+              <a:rPr lang="en-US" altLang="zh-TW" b="0" i="0" dirty="0">
+                <a:solidFill>
+                  <a:srgbClr val="303233"/>
+                </a:solidFill>
+                <a:effectLst/>
+                <a:latin typeface="Lato" panose="020F0502020204030203" pitchFamily="34" charset="0"/>
+              </a:rPr>
+              <a:t>HEAD</a:t>
+            </a:r>
+            <a:r>
+              <a:rPr lang="zh-TW" altLang="en-US" b="0" i="0" dirty="0">
+                <a:solidFill>
+                  <a:srgbClr val="303233"/>
+                </a:solidFill>
+                <a:effectLst/>
+                <a:latin typeface="Lato" panose="020F0502020204030203" pitchFamily="34" charset="0"/>
+              </a:rPr>
+              <a:t>設定為你指定的</a:t>
+            </a:r>
+            <a:r>
+              <a:rPr lang="en-US" altLang="zh-TW" b="0" i="0" dirty="0">
+                <a:solidFill>
+                  <a:srgbClr val="303233"/>
+                </a:solidFill>
+                <a:effectLst/>
+                <a:latin typeface="Lato" panose="020F0502020204030203" pitchFamily="34" charset="0"/>
+              </a:rPr>
+              <a:t>commit</a:t>
+            </a:r>
+            <a:r>
+              <a:rPr lang="zh-TW" altLang="en-US" b="0" i="0" dirty="0">
+                <a:solidFill>
+                  <a:srgbClr val="303233"/>
+                </a:solidFill>
+                <a:effectLst/>
+                <a:latin typeface="Lato" panose="020F0502020204030203" pitchFamily="34" charset="0"/>
+              </a:rPr>
+              <a:t>，而且如果是用</a:t>
+            </a:r>
+            <a:r>
+              <a:rPr lang="en-US" altLang="zh-TW" b="0" i="0" dirty="0">
+                <a:solidFill>
+                  <a:srgbClr val="303233"/>
+                </a:solidFill>
+                <a:effectLst/>
+                <a:latin typeface="Lato" panose="020F0502020204030203" pitchFamily="34" charset="0"/>
+              </a:rPr>
+              <a:t>HARD</a:t>
+            </a:r>
+            <a:r>
+              <a:rPr lang="zh-TW" altLang="en-US" b="0" i="0" dirty="0">
+                <a:solidFill>
+                  <a:srgbClr val="303233"/>
+                </a:solidFill>
+                <a:effectLst/>
+                <a:latin typeface="Lato" panose="020F0502020204030203" pitchFamily="34" charset="0"/>
+              </a:rPr>
+              <a:t>去</a:t>
+            </a:r>
+            <a:r>
+              <a:rPr lang="en-US" altLang="zh-TW" b="0" i="0" dirty="0">
+                <a:solidFill>
+                  <a:srgbClr val="303233"/>
+                </a:solidFill>
+                <a:effectLst/>
+                <a:latin typeface="Lato" panose="020F0502020204030203" pitchFamily="34" charset="0"/>
+              </a:rPr>
+              <a:t>reset</a:t>
+            </a:r>
+            <a:r>
+              <a:rPr lang="zh-TW" altLang="en-US" b="0" i="0" dirty="0">
+                <a:solidFill>
+                  <a:srgbClr val="303233"/>
+                </a:solidFill>
+                <a:effectLst/>
+                <a:latin typeface="Lato" panose="020F0502020204030203" pitchFamily="34" charset="0"/>
+              </a:rPr>
+              <a:t>，會將該</a:t>
+            </a:r>
+            <a:r>
+              <a:rPr lang="en-US" altLang="zh-TW" b="0" i="0" dirty="0">
+                <a:solidFill>
+                  <a:srgbClr val="303233"/>
+                </a:solidFill>
+                <a:effectLst/>
+                <a:latin typeface="Lato" panose="020F0502020204030203" pitchFamily="34" charset="0"/>
+              </a:rPr>
+              <a:t>commit</a:t>
+            </a:r>
+            <a:r>
+              <a:rPr lang="zh-TW" altLang="en-US" b="0" i="0" dirty="0">
+                <a:solidFill>
+                  <a:srgbClr val="303233"/>
+                </a:solidFill>
+                <a:effectLst/>
+                <a:latin typeface="Lato" panose="020F0502020204030203" pitchFamily="34" charset="0"/>
+              </a:rPr>
+              <a:t>之後的</a:t>
+            </a:r>
+            <a:r>
+              <a:rPr lang="en-US" altLang="zh-TW" b="0" i="0" dirty="0">
+                <a:solidFill>
+                  <a:srgbClr val="303233"/>
+                </a:solidFill>
+                <a:effectLst/>
+                <a:latin typeface="Lato" panose="020F0502020204030203" pitchFamily="34" charset="0"/>
+              </a:rPr>
+              <a:t>commit</a:t>
+            </a:r>
+            <a:r>
+              <a:rPr lang="zh-TW" altLang="en-US" b="0" i="0" dirty="0">
+                <a:solidFill>
+                  <a:srgbClr val="303233"/>
+                </a:solidFill>
+                <a:effectLst/>
+                <a:latin typeface="Lato" panose="020F0502020204030203" pitchFamily="34" charset="0"/>
+              </a:rPr>
+              <a:t>都會消失</a:t>
+            </a:r>
+          </a:p>
+          <a:p>
+            <a:pPr algn="l">
+              <a:buFont typeface="Arial" panose="020B0604020202020204" pitchFamily="34" charset="0"/>
+              <a:buChar char="•"/>
+            </a:pPr>
+            <a:r>
+              <a:rPr lang="en-US" altLang="zh-TW" b="0" i="0" dirty="0">
+                <a:solidFill>
+                  <a:srgbClr val="303233"/>
+                </a:solidFill>
+                <a:effectLst/>
+                <a:latin typeface="Lato" panose="020F0502020204030203" pitchFamily="34" charset="0"/>
+              </a:rPr>
+              <a:t>revert</a:t>
+            </a:r>
+          </a:p>
+          <a:p>
+            <a:pPr marL="742950" lvl="1" indent="-285750" algn="l">
+              <a:buFont typeface="Arial" panose="020B0604020202020204" pitchFamily="34" charset="0"/>
+              <a:buChar char="•"/>
+            </a:pPr>
+            <a:r>
+              <a:rPr lang="zh-TW" altLang="en-US" b="0" i="0" dirty="0">
+                <a:solidFill>
+                  <a:srgbClr val="303233"/>
+                </a:solidFill>
+                <a:effectLst/>
+                <a:latin typeface="Lato" panose="020F0502020204030203" pitchFamily="34" charset="0"/>
+              </a:rPr>
+              <a:t>會將你指定的該次</a:t>
+            </a:r>
+            <a:r>
+              <a:rPr lang="en-US" altLang="zh-TW" b="0" i="0" dirty="0">
+                <a:solidFill>
+                  <a:srgbClr val="303233"/>
+                </a:solidFill>
+                <a:effectLst/>
+                <a:latin typeface="Lato" panose="020F0502020204030203" pitchFamily="34" charset="0"/>
+              </a:rPr>
+              <a:t>commit</a:t>
+            </a:r>
+            <a:r>
+              <a:rPr lang="zh-TW" altLang="en-US" b="0" i="0" dirty="0">
+                <a:solidFill>
+                  <a:srgbClr val="303233"/>
+                </a:solidFill>
+                <a:effectLst/>
+                <a:latin typeface="Lato" panose="020F0502020204030203" pitchFamily="34" charset="0"/>
+              </a:rPr>
+              <a:t>做反向的處理，也就是會把這個</a:t>
+            </a:r>
+            <a:r>
+              <a:rPr lang="en-US" altLang="zh-TW" b="0" i="0" dirty="0">
+                <a:solidFill>
+                  <a:srgbClr val="303233"/>
+                </a:solidFill>
+                <a:effectLst/>
+                <a:latin typeface="Lato" panose="020F0502020204030203" pitchFamily="34" charset="0"/>
+              </a:rPr>
+              <a:t>commit</a:t>
+            </a:r>
+            <a:r>
+              <a:rPr lang="zh-TW" altLang="en-US" b="0" i="0" dirty="0">
+                <a:solidFill>
+                  <a:srgbClr val="303233"/>
+                </a:solidFill>
+                <a:effectLst/>
+                <a:latin typeface="Lato" panose="020F0502020204030203" pitchFamily="34" charset="0"/>
+              </a:rPr>
+              <a:t>做過的異動，反過來做一次讓它這些異動消失</a:t>
+            </a:r>
+            <a:br>
+              <a:rPr lang="zh-TW" altLang="en-US" b="0" i="0" dirty="0">
+                <a:solidFill>
+                  <a:srgbClr val="303233"/>
+                </a:solidFill>
+                <a:effectLst/>
+                <a:latin typeface="Lato" panose="020F0502020204030203" pitchFamily="34" charset="0"/>
+              </a:rPr>
+            </a:br>
+            <a:r>
+              <a:rPr lang="zh-TW" altLang="en-US" b="0" i="0" dirty="0">
+                <a:solidFill>
+                  <a:srgbClr val="303233"/>
+                </a:solidFill>
+                <a:effectLst/>
+                <a:latin typeface="Lato" panose="020F0502020204030203" pitchFamily="34" charset="0"/>
+              </a:rPr>
+              <a:t>，這個不影響前後的</a:t>
+            </a:r>
+            <a:r>
+              <a:rPr lang="en-US" altLang="zh-TW" b="0" i="0" dirty="0">
+                <a:solidFill>
+                  <a:srgbClr val="303233"/>
+                </a:solidFill>
+                <a:effectLst/>
+                <a:latin typeface="Lato" panose="020F0502020204030203" pitchFamily="34" charset="0"/>
+              </a:rPr>
+              <a:t>commit</a:t>
+            </a:r>
+            <a:r>
+              <a:rPr lang="zh-TW" altLang="en-US" b="0" i="0" dirty="0">
+                <a:solidFill>
+                  <a:srgbClr val="303233"/>
+                </a:solidFill>
+                <a:effectLst/>
+                <a:latin typeface="Lato" panose="020F0502020204030203" pitchFamily="34" charset="0"/>
+              </a:rPr>
+              <a:t>，且</a:t>
+            </a:r>
+            <a:r>
+              <a:rPr lang="en-US" altLang="zh-TW" b="0" i="0" dirty="0">
+                <a:solidFill>
+                  <a:srgbClr val="303233"/>
+                </a:solidFill>
+                <a:effectLst/>
+                <a:latin typeface="Lato" panose="020F0502020204030203" pitchFamily="34" charset="0"/>
+              </a:rPr>
+              <a:t>revert</a:t>
+            </a:r>
+            <a:r>
+              <a:rPr lang="zh-TW" altLang="en-US" b="0" i="0" dirty="0">
+                <a:solidFill>
+                  <a:srgbClr val="303233"/>
+                </a:solidFill>
+                <a:effectLst/>
+                <a:latin typeface="Lato" panose="020F0502020204030203" pitchFamily="34" charset="0"/>
+              </a:rPr>
+              <a:t>後的版本會需要處理衝突後並且</a:t>
+            </a:r>
+            <a:r>
+              <a:rPr lang="en-US" altLang="zh-TW" b="0" i="0" dirty="0">
+                <a:solidFill>
+                  <a:srgbClr val="303233"/>
+                </a:solidFill>
+                <a:effectLst/>
+                <a:latin typeface="Lato" panose="020F0502020204030203" pitchFamily="34" charset="0"/>
+              </a:rPr>
+              <a:t>commit</a:t>
+            </a:r>
+            <a:r>
+              <a:rPr lang="zh-TW" altLang="en-US" b="0" i="0" dirty="0">
+                <a:solidFill>
+                  <a:srgbClr val="303233"/>
+                </a:solidFill>
+                <a:effectLst/>
+                <a:latin typeface="Lato" panose="020F0502020204030203" pitchFamily="34" charset="0"/>
+              </a:rPr>
+              <a:t>為一個新版，不會修改</a:t>
+            </a:r>
+            <a:r>
+              <a:rPr lang="en-US" altLang="zh-TW" b="0" i="0" dirty="0">
+                <a:solidFill>
+                  <a:srgbClr val="303233"/>
+                </a:solidFill>
+                <a:effectLst/>
+                <a:latin typeface="Lato" panose="020F0502020204030203" pitchFamily="34" charset="0"/>
+              </a:rPr>
+              <a:t>commit history</a:t>
+            </a:r>
+          </a:p>
+          <a:p>
+            <a:endParaRPr lang="zh-TW" altLang="en-US" dirty="0"/>
+          </a:p>
+        </p:txBody>
+      </p:sp>
+    </p:spTree>
+    <p:extLst>
+      <p:ext uri="{BB962C8B-B14F-4D97-AF65-F5344CB8AC3E}">
+        <p14:creationId xmlns:p14="http://schemas.microsoft.com/office/powerpoint/2010/main" val="3137920116"/>
       </p:ext>
     </p:extLst>
   </p:cSld>

</xml_diff>